<commit_message>
add demo + component definition
</commit_message>
<xml_diff>
--- a/schemas.pptx
+++ b/schemas.pptx
@@ -5,12 +5,15 @@
     <p:sldMasterId id="2147483648" r:id="rId1"/>
   </p:sldMasterIdLst>
   <p:notesMasterIdLst>
-    <p:notesMasterId r:id="rId5"/>
+    <p:notesMasterId r:id="rId8"/>
   </p:notesMasterIdLst>
   <p:sldIdLst>
     <p:sldId id="256" r:id="rId2"/>
     <p:sldId id="258" r:id="rId3"/>
     <p:sldId id="257" r:id="rId4"/>
+    <p:sldId id="259" r:id="rId5"/>
+    <p:sldId id="261" r:id="rId6"/>
+    <p:sldId id="260" r:id="rId7"/>
   </p:sldIdLst>
   <p:sldSz cx="12192000" cy="6858000"/>
   <p:notesSz cx="6858000" cy="9144000"/>
@@ -5602,6 +5605,423 @@
   <p:clrMapOvr>
     <a:masterClrMapping/>
   </p:clrMapOvr>
+</p:sld>
+</file>
+
+<file path=ppt/slides/slide4.xml><?xml version="1.0" encoding="utf-8"?>
+<p:sld xmlns:a="http://schemas.openxmlformats.org/drawingml/2006/main" xmlns:r="http://schemas.openxmlformats.org/officeDocument/2006/relationships" xmlns:p="http://schemas.openxmlformats.org/presentationml/2006/main">
+  <p:cSld>
+    <p:bg>
+      <p:bgPr>
+        <a:solidFill>
+          <a:schemeClr val="bg1"/>
+        </a:solidFill>
+        <a:effectLst/>
+      </p:bgPr>
+    </p:bg>
+    <p:spTree>
+      <p:nvGrpSpPr>
+        <p:cNvPr id="1" name=""/>
+        <p:cNvGrpSpPr/>
+        <p:nvPr/>
+      </p:nvGrpSpPr>
+      <p:grpSpPr>
+        <a:xfrm>
+          <a:off x="0" y="0"/>
+          <a:ext cx="0" cy="0"/>
+          <a:chOff x="0" y="0"/>
+          <a:chExt cx="0" cy="0"/>
+        </a:xfrm>
+      </p:grpSpPr>
+      <p:pic>
+        <p:nvPicPr>
+          <p:cNvPr id="5" name="Picture 4"/>
+          <p:cNvPicPr>
+            <a:picLocks noChangeAspect="1"/>
+          </p:cNvPicPr>
+          <p:nvPr/>
+        </p:nvPicPr>
+        <p:blipFill rotWithShape="1">
+          <a:blip r:embed="rId2">
+            <a:extLst>
+              <a:ext uri="{28A0092B-C50C-407E-A947-70E740481C1C}">
+                <a14:useLocalDpi xmlns:a14="http://schemas.microsoft.com/office/drawing/2010/main" val="0"/>
+              </a:ext>
+            </a:extLst>
+          </a:blip>
+          <a:srcRect b="19929"/>
+          <a:stretch/>
+        </p:blipFill>
+        <p:spPr>
+          <a:xfrm>
+            <a:off x="20" y="10"/>
+            <a:ext cx="12191980" cy="6857990"/>
+          </a:xfrm>
+          <a:prstGeom prst="rect">
+            <a:avLst/>
+          </a:prstGeom>
+        </p:spPr>
+      </p:pic>
+    </p:spTree>
+    <p:extLst>
+      <p:ext uri="{BB962C8B-B14F-4D97-AF65-F5344CB8AC3E}">
+        <p14:creationId xmlns:p14="http://schemas.microsoft.com/office/powerpoint/2010/main" val="3520797386"/>
+      </p:ext>
+    </p:extLst>
+  </p:cSld>
+  <p:clrMapOvr>
+    <a:masterClrMapping/>
+  </p:clrMapOvr>
+  <p:timing>
+    <p:tnLst>
+      <p:par>
+        <p:cTn id="1" dur="indefinite" restart="never" nodeType="tmRoot"/>
+      </p:par>
+    </p:tnLst>
+  </p:timing>
+</p:sld>
+</file>
+
+<file path=ppt/slides/slide5.xml><?xml version="1.0" encoding="utf-8"?>
+<p:sld xmlns:a="http://schemas.openxmlformats.org/drawingml/2006/main" xmlns:r="http://schemas.openxmlformats.org/officeDocument/2006/relationships" xmlns:p="http://schemas.openxmlformats.org/presentationml/2006/main">
+  <p:cSld>
+    <p:bg>
+      <p:bgPr>
+        <a:solidFill>
+          <a:schemeClr val="bg1"/>
+        </a:solidFill>
+        <a:effectLst/>
+      </p:bgPr>
+    </p:bg>
+    <p:spTree>
+      <p:nvGrpSpPr>
+        <p:cNvPr id="1" name=""/>
+        <p:cNvGrpSpPr/>
+        <p:nvPr/>
+      </p:nvGrpSpPr>
+      <p:grpSpPr>
+        <a:xfrm>
+          <a:off x="0" y="0"/>
+          <a:ext cx="0" cy="0"/>
+          <a:chOff x="0" y="0"/>
+          <a:chExt cx="0" cy="0"/>
+        </a:xfrm>
+      </p:grpSpPr>
+      <p:pic>
+        <p:nvPicPr>
+          <p:cNvPr id="5" name="Picture 4"/>
+          <p:cNvPicPr>
+            <a:picLocks noChangeAspect="1"/>
+          </p:cNvPicPr>
+          <p:nvPr/>
+        </p:nvPicPr>
+        <p:blipFill rotWithShape="1">
+          <a:blip r:embed="rId2">
+            <a:extLst>
+              <a:ext uri="{28A0092B-C50C-407E-A947-70E740481C1C}">
+                <a14:useLocalDpi xmlns:a14="http://schemas.microsoft.com/office/drawing/2010/main" val="0"/>
+              </a:ext>
+            </a:extLst>
+          </a:blip>
+          <a:srcRect b="19929"/>
+          <a:stretch/>
+        </p:blipFill>
+        <p:spPr>
+          <a:xfrm>
+            <a:off x="0" y="0"/>
+            <a:ext cx="12191980" cy="6857990"/>
+          </a:xfrm>
+          <a:prstGeom prst="rect">
+            <a:avLst/>
+          </a:prstGeom>
+        </p:spPr>
+      </p:pic>
+      <p:pic>
+        <p:nvPicPr>
+          <p:cNvPr id="6" name="Picture 5"/>
+          <p:cNvPicPr>
+            <a:picLocks noChangeAspect="1"/>
+          </p:cNvPicPr>
+          <p:nvPr/>
+        </p:nvPicPr>
+        <p:blipFill rotWithShape="1">
+          <a:blip r:embed="rId2">
+            <a:extLst>
+              <a:ext uri="{28A0092B-C50C-407E-A947-70E740481C1C}">
+                <a14:useLocalDpi xmlns:a14="http://schemas.microsoft.com/office/drawing/2010/main" val="0"/>
+              </a:ext>
+            </a:extLst>
+          </a:blip>
+          <a:srcRect b="19929"/>
+          <a:stretch/>
+        </p:blipFill>
+        <p:spPr>
+          <a:xfrm>
+            <a:off x="20" y="0"/>
+            <a:ext cx="12191980" cy="6857990"/>
+          </a:xfrm>
+          <a:prstGeom prst="rect">
+            <a:avLst/>
+          </a:prstGeom>
+        </p:spPr>
+      </p:pic>
+      <p:sp>
+        <p:nvSpPr>
+          <p:cNvPr id="8" name="Rectangle 7"/>
+          <p:cNvSpPr/>
+          <p:nvPr/>
+        </p:nvSpPr>
+        <p:spPr>
+          <a:xfrm>
+            <a:off x="20" y="0"/>
+            <a:ext cx="12191980" cy="6858000"/>
+          </a:xfrm>
+          <a:prstGeom prst="rect">
+            <a:avLst/>
+          </a:prstGeom>
+          <a:solidFill>
+            <a:schemeClr val="tx1">
+              <a:alpha val="74000"/>
+            </a:schemeClr>
+          </a:solidFill>
+          <a:ln>
+            <a:noFill/>
+          </a:ln>
+          <a:effectLst>
+            <a:glow rad="127000">
+              <a:schemeClr val="bg2">
+                <a:lumMod val="50000"/>
+                <a:alpha val="49000"/>
+              </a:schemeClr>
+            </a:glow>
+          </a:effectLst>
+        </p:spPr>
+        <p:style>
+          <a:lnRef idx="1">
+            <a:schemeClr val="accent3"/>
+          </a:lnRef>
+          <a:fillRef idx="2">
+            <a:schemeClr val="accent3"/>
+          </a:fillRef>
+          <a:effectRef idx="1">
+            <a:schemeClr val="accent3"/>
+          </a:effectRef>
+          <a:fontRef idx="minor">
+            <a:schemeClr val="dk1"/>
+          </a:fontRef>
+        </p:style>
+        <p:txBody>
+          <a:bodyPr rtlCol="0" anchor="ctr"/>
+          <a:lstStyle/>
+          <a:p>
+            <a:pPr algn="ctr"/>
+            <a:endParaRPr lang="en-US"/>
+          </a:p>
+        </p:txBody>
+      </p:sp>
+      <p:pic>
+        <p:nvPicPr>
+          <p:cNvPr id="7" name="Picture 6"/>
+          <p:cNvPicPr>
+            <a:picLocks noChangeAspect="1"/>
+          </p:cNvPicPr>
+          <p:nvPr/>
+        </p:nvPicPr>
+        <p:blipFill rotWithShape="1">
+          <a:blip r:embed="rId2">
+            <a:extLst>
+              <a:ext uri="{28A0092B-C50C-407E-A947-70E740481C1C}">
+                <a14:useLocalDpi xmlns:a14="http://schemas.microsoft.com/office/drawing/2010/main" val="0"/>
+              </a:ext>
+            </a:extLst>
+          </a:blip>
+          <a:srcRect l="6737" t="11943" r="77119" b="37391"/>
+          <a:stretch/>
+        </p:blipFill>
+        <p:spPr>
+          <a:xfrm>
+            <a:off x="821410" y="1022888"/>
+            <a:ext cx="1968285" cy="4339526"/>
+          </a:xfrm>
+          <a:prstGeom prst="rect">
+            <a:avLst/>
+          </a:prstGeom>
+        </p:spPr>
+      </p:pic>
+    </p:spTree>
+    <p:extLst>
+      <p:ext uri="{BB962C8B-B14F-4D97-AF65-F5344CB8AC3E}">
+        <p14:creationId xmlns:p14="http://schemas.microsoft.com/office/powerpoint/2010/main" val="695319507"/>
+      </p:ext>
+    </p:extLst>
+  </p:cSld>
+  <p:clrMapOvr>
+    <a:masterClrMapping/>
+  </p:clrMapOvr>
+  <p:timing>
+    <p:tnLst>
+      <p:par>
+        <p:cTn id="1" dur="indefinite" restart="never" nodeType="tmRoot"/>
+      </p:par>
+    </p:tnLst>
+  </p:timing>
+</p:sld>
+</file>
+
+<file path=ppt/slides/slide6.xml><?xml version="1.0" encoding="utf-8"?>
+<p:sld xmlns:a="http://schemas.openxmlformats.org/drawingml/2006/main" xmlns:r="http://schemas.openxmlformats.org/officeDocument/2006/relationships" xmlns:p="http://schemas.openxmlformats.org/presentationml/2006/main">
+  <p:cSld>
+    <p:bg>
+      <p:bgPr>
+        <a:solidFill>
+          <a:schemeClr val="bg1"/>
+        </a:solidFill>
+        <a:effectLst/>
+      </p:bgPr>
+    </p:bg>
+    <p:spTree>
+      <p:nvGrpSpPr>
+        <p:cNvPr id="1" name=""/>
+        <p:cNvGrpSpPr/>
+        <p:nvPr/>
+      </p:nvGrpSpPr>
+      <p:grpSpPr>
+        <a:xfrm>
+          <a:off x="0" y="0"/>
+          <a:ext cx="0" cy="0"/>
+          <a:chOff x="0" y="0"/>
+          <a:chExt cx="0" cy="0"/>
+        </a:xfrm>
+      </p:grpSpPr>
+      <p:pic>
+        <p:nvPicPr>
+          <p:cNvPr id="5" name="Picture 4"/>
+          <p:cNvPicPr>
+            <a:picLocks noChangeAspect="1"/>
+          </p:cNvPicPr>
+          <p:nvPr/>
+        </p:nvPicPr>
+        <p:blipFill rotWithShape="1">
+          <a:blip r:embed="rId2">
+            <a:extLst>
+              <a:ext uri="{28A0092B-C50C-407E-A947-70E740481C1C}">
+                <a14:useLocalDpi xmlns:a14="http://schemas.microsoft.com/office/drawing/2010/main" val="0"/>
+              </a:ext>
+            </a:extLst>
+          </a:blip>
+          <a:srcRect b="19929"/>
+          <a:stretch/>
+        </p:blipFill>
+        <p:spPr>
+          <a:xfrm>
+            <a:off x="0" y="0"/>
+            <a:ext cx="12191980" cy="6857990"/>
+          </a:xfrm>
+          <a:prstGeom prst="rect">
+            <a:avLst/>
+          </a:prstGeom>
+        </p:spPr>
+      </p:pic>
+      <p:sp>
+        <p:nvSpPr>
+          <p:cNvPr id="10" name="Rectangle 9"/>
+          <p:cNvSpPr/>
+          <p:nvPr/>
+        </p:nvSpPr>
+        <p:spPr>
+          <a:xfrm>
+            <a:off x="20" y="0"/>
+            <a:ext cx="12191980" cy="6858000"/>
+          </a:xfrm>
+          <a:prstGeom prst="rect">
+            <a:avLst/>
+          </a:prstGeom>
+          <a:solidFill>
+            <a:schemeClr val="tx1">
+              <a:alpha val="74000"/>
+            </a:schemeClr>
+          </a:solidFill>
+          <a:ln>
+            <a:noFill/>
+          </a:ln>
+          <a:effectLst>
+            <a:glow rad="127000">
+              <a:schemeClr val="bg2">
+                <a:lumMod val="50000"/>
+                <a:alpha val="49000"/>
+              </a:schemeClr>
+            </a:glow>
+          </a:effectLst>
+        </p:spPr>
+        <p:style>
+          <a:lnRef idx="1">
+            <a:schemeClr val="accent3"/>
+          </a:lnRef>
+          <a:fillRef idx="2">
+            <a:schemeClr val="accent3"/>
+          </a:fillRef>
+          <a:effectRef idx="1">
+            <a:schemeClr val="accent3"/>
+          </a:effectRef>
+          <a:fontRef idx="minor">
+            <a:schemeClr val="dk1"/>
+          </a:fontRef>
+        </p:style>
+        <p:txBody>
+          <a:bodyPr rtlCol="0" anchor="ctr"/>
+          <a:lstStyle/>
+          <a:p>
+            <a:pPr algn="ctr"/>
+            <a:endParaRPr lang="en-US"/>
+          </a:p>
+        </p:txBody>
+      </p:sp>
+      <p:pic>
+        <p:nvPicPr>
+          <p:cNvPr id="9" name="Picture 8"/>
+          <p:cNvPicPr>
+            <a:picLocks noChangeAspect="1"/>
+          </p:cNvPicPr>
+          <p:nvPr/>
+        </p:nvPicPr>
+        <p:blipFill rotWithShape="1">
+          <a:blip r:embed="rId2">
+            <a:extLst>
+              <a:ext uri="{28A0092B-C50C-407E-A947-70E740481C1C}">
+                <a14:useLocalDpi xmlns:a14="http://schemas.microsoft.com/office/drawing/2010/main" val="0"/>
+              </a:ext>
+            </a:extLst>
+          </a:blip>
+          <a:srcRect l="76907" t="11761" r="1865" b="41010"/>
+          <a:stretch/>
+        </p:blipFill>
+        <p:spPr>
+          <a:xfrm>
+            <a:off x="9376475" y="1007390"/>
+            <a:ext cx="2588217" cy="4045057"/>
+          </a:xfrm>
+          <a:prstGeom prst="rect">
+            <a:avLst/>
+          </a:prstGeom>
+        </p:spPr>
+      </p:pic>
+    </p:spTree>
+    <p:extLst>
+      <p:ext uri="{BB962C8B-B14F-4D97-AF65-F5344CB8AC3E}">
+        <p14:creationId xmlns:p14="http://schemas.microsoft.com/office/powerpoint/2010/main" val="1505997724"/>
+      </p:ext>
+    </p:extLst>
+  </p:cSld>
+  <p:clrMapOvr>
+    <a:masterClrMapping/>
+  </p:clrMapOvr>
+  <p:timing>
+    <p:tnLst>
+      <p:par>
+        <p:cTn id="1" dur="indefinite" restart="never" nodeType="tmRoot"/>
+      </p:par>
+    </p:tnLst>
+  </p:timing>
 </p:sld>
 </file>
 

</xml_diff>